<commit_message>
Oppdatert Powerpoint med kommentarer
</commit_message>
<xml_diff>
--- a/Material/MVC.pptx
+++ b/Material/MVC.pptx
@@ -161,7 +161,7 @@
   </p:defaultTextStyle>
   <p:extLst>
     <p:ext uri="{EFAFB233-063F-42B5-8137-9DF3F51BA10A}">
-      <p15:sldGuideLst xmlns:p15="http://schemas.microsoft.com/office/powerpoint/2012/main" xmlns="">
+      <p15:sldGuideLst xmlns="" xmlns:p15="http://schemas.microsoft.com/office/powerpoint/2012/main">
         <p15:guide id="1" orient="horz" pos="2160">
           <p15:clr>
             <a:srgbClr val="A4A3A4"/>
@@ -261,7 +261,7 @@
             <a:fld id="{6A1CD613-00B3-F141-B6FD-518AEC315CE3}" type="datetime1">
               <a:rPr lang="nb-NO"/>
               <a:pPr/>
-              <a:t>09.09.2012</a:t>
+              <a:t>10.09.2012</a:t>
             </a:fld>
             <a:endParaRPr lang="nn-NO"/>
           </a:p>
@@ -429,7 +429,7 @@
             <a:fld id="{071FFDA9-16CA-5545-BE57-6C81A5B4E44B}" type="datetime1">
               <a:rPr lang="nb-NO"/>
               <a:pPr/>
-              <a:t>09.09.2012</a:t>
+              <a:t>10.09.2012</a:t>
             </a:fld>
             <a:endParaRPr lang="nn-NO"/>
           </a:p>
@@ -856,7 +856,7 @@
             <a:fld id="{528E7876-5FAB-5445-B77E-737DA6EC0B43}" type="slidenum">
               <a:rPr lang="nb-NO" smtClean="0"/>
               <a:pPr/>
-              <a:t>17</a:t>
+              <a:t>15</a:t>
             </a:fld>
             <a:endParaRPr lang="nb-NO"/>
           </a:p>
@@ -941,7 +941,7 @@
             <a:fld id="{528E7876-5FAB-5445-B77E-737DA6EC0B43}" type="slidenum">
               <a:rPr lang="nb-NO" smtClean="0"/>
               <a:pPr/>
-              <a:t>18</a:t>
+              <a:t>16</a:t>
             </a:fld>
             <a:endParaRPr lang="nb-NO"/>
           </a:p>
@@ -1026,7 +1026,7 @@
             <a:fld id="{528E7876-5FAB-5445-B77E-737DA6EC0B43}" type="slidenum">
               <a:rPr lang="nb-NO" smtClean="0"/>
               <a:pPr/>
-              <a:t>19</a:t>
+              <a:t>17</a:t>
             </a:fld>
             <a:endParaRPr lang="nb-NO"/>
           </a:p>
@@ -1089,6 +1089,34 @@
           <a:bodyPr/>
           <a:lstStyle/>
           <a:p>
+            <a:r>
+              <a:rPr lang="nb-NO" dirty="0" smtClean="0"/>
+              <a:t>WebForms har en sterk binding mellom kontroller på siden og koden bak</a:t>
+            </a:r>
+          </a:p>
+          <a:p>
+            <a:r>
+              <a:rPr lang="nb-NO" dirty="0" smtClean="0"/>
+              <a:t>Utrolig vanskelig å skrive gode tester</a:t>
+            </a:r>
+          </a:p>
+          <a:p>
+            <a:r>
+              <a:rPr lang="nb-NO" dirty="0" smtClean="0"/>
+              <a:t>Veldig vanskelig å få en god struktur</a:t>
+            </a:r>
+          </a:p>
+          <a:p>
+            <a:r>
+              <a:rPr lang="nb-NO" dirty="0" smtClean="0"/>
+              <a:t>WebForms</a:t>
+            </a:r>
+            <a:r>
+              <a:rPr lang="nb-NO" baseline="0" dirty="0" smtClean="0"/>
+              <a:t> = Forsøk på å dytte WinForms ut på Web</a:t>
+            </a:r>
+          </a:p>
+          <a:p>
             <a:endParaRPr lang="nb-NO" dirty="0"/>
           </a:p>
         </p:txBody>
@@ -1111,7 +1139,7 @@
             <a:fld id="{528E7876-5FAB-5445-B77E-737DA6EC0B43}" type="slidenum">
               <a:rPr lang="nb-NO" smtClean="0"/>
               <a:pPr/>
-              <a:t>20</a:t>
+              <a:t>18</a:t>
             </a:fld>
             <a:endParaRPr lang="nb-NO"/>
           </a:p>
@@ -1196,7 +1224,7 @@
             <a:fld id="{528E7876-5FAB-5445-B77E-737DA6EC0B43}" type="slidenum">
               <a:rPr lang="nb-NO" smtClean="0"/>
               <a:pPr/>
-              <a:t>21</a:t>
+              <a:t>19</a:t>
             </a:fld>
             <a:endParaRPr lang="nb-NO"/>
           </a:p>
@@ -1281,7 +1309,7 @@
             <a:fld id="{528E7876-5FAB-5445-B77E-737DA6EC0B43}" type="slidenum">
               <a:rPr lang="nb-NO" smtClean="0"/>
               <a:pPr/>
-              <a:t>23</a:t>
+              <a:t>20</a:t>
             </a:fld>
             <a:endParaRPr lang="nb-NO"/>
           </a:p>
@@ -1366,7 +1394,7 @@
             <a:fld id="{528E7876-5FAB-5445-B77E-737DA6EC0B43}" type="slidenum">
               <a:rPr lang="nb-NO" smtClean="0"/>
               <a:pPr/>
-              <a:t>24</a:t>
+              <a:t>21</a:t>
             </a:fld>
             <a:endParaRPr lang="nb-NO"/>
           </a:p>
@@ -1451,7 +1479,7 @@
             <a:fld id="{528E7876-5FAB-5445-B77E-737DA6EC0B43}" type="slidenum">
               <a:rPr lang="nb-NO" smtClean="0"/>
               <a:pPr/>
-              <a:t>25</a:t>
+              <a:t>23</a:t>
             </a:fld>
             <a:endParaRPr lang="nb-NO"/>
           </a:p>
@@ -1514,6 +1542,22 @@
           <a:bodyPr/>
           <a:lstStyle/>
           <a:p>
+            <a:r>
+              <a:rPr lang="nb-NO" dirty="0" smtClean="0"/>
+              <a:t>...og det er BRA!</a:t>
+            </a:r>
+          </a:p>
+          <a:p>
+            <a:r>
+              <a:rPr lang="nb-NO" dirty="0" smtClean="0"/>
+              <a:t>Hvorfor</a:t>
+            </a:r>
+            <a:r>
+              <a:rPr lang="nb-NO" baseline="0" dirty="0" smtClean="0"/>
+              <a:t> skal man trenger Code Behind?</a:t>
+            </a:r>
+          </a:p>
+          <a:p>
             <a:endParaRPr lang="nb-NO" dirty="0"/>
           </a:p>
         </p:txBody>
@@ -1536,7 +1580,7 @@
             <a:fld id="{528E7876-5FAB-5445-B77E-737DA6EC0B43}" type="slidenum">
               <a:rPr lang="nb-NO" smtClean="0"/>
               <a:pPr/>
-              <a:t>26</a:t>
+              <a:t>24</a:t>
             </a:fld>
             <a:endParaRPr lang="nb-NO"/>
           </a:p>
@@ -1599,6 +1643,20 @@
           <a:bodyPr/>
           <a:lstStyle/>
           <a:p>
+            <a:r>
+              <a:rPr lang="nb-NO" dirty="0" smtClean="0"/>
+              <a:t>EventHandlers er fælt!</a:t>
+            </a:r>
+          </a:p>
+          <a:p>
+            <a:r>
+              <a:rPr lang="nb-NO" dirty="0" smtClean="0"/>
+              <a:t>MVC</a:t>
+            </a:r>
+            <a:r>
+              <a:rPr lang="nb-NO" baseline="0" dirty="0" smtClean="0"/>
+              <a:t> benytter seg av HTTP-protokollen istedet for rammeverk-spesifikke greier</a:t>
+            </a:r>
             <a:endParaRPr lang="nb-NO" dirty="0"/>
           </a:p>
         </p:txBody>
@@ -1621,7 +1679,7 @@
             <a:fld id="{528E7876-5FAB-5445-B77E-737DA6EC0B43}" type="slidenum">
               <a:rPr lang="nb-NO" smtClean="0"/>
               <a:pPr/>
-              <a:t>27</a:t>
+              <a:t>25</a:t>
             </a:fld>
             <a:endParaRPr lang="nb-NO"/>
           </a:p>
@@ -1686,7 +1744,7 @@
           <a:p>
             <a:r>
               <a:rPr lang="nb-NO" dirty="0" smtClean="0"/>
-              <a:t>HTML+Razor</a:t>
+              <a:t>- Model er en «dum» klasse som kun skal inneholde data som trengs for å vise Viewet riktig</a:t>
             </a:r>
             <a:endParaRPr lang="nb-NO" dirty="0"/>
           </a:p>
@@ -1710,7 +1768,7 @@
             <a:fld id="{528E7876-5FAB-5445-B77E-737DA6EC0B43}" type="slidenum">
               <a:rPr lang="nb-NO" smtClean="0"/>
               <a:pPr/>
-              <a:t>7</a:t>
+              <a:t>6</a:t>
             </a:fld>
             <a:endParaRPr lang="nb-NO"/>
           </a:p>
@@ -1719,7 +1777,7 @@
     </p:spTree>
     <p:extLst>
       <p:ext uri="{BB962C8B-B14F-4D97-AF65-F5344CB8AC3E}">
-        <p14:creationId xmlns:p14="http://schemas.microsoft.com/office/powerpoint/2010/main" val="2990323578"/>
+        <p14:creationId xmlns:p14="http://schemas.microsoft.com/office/powerpoint/2010/main" val="3950935386"/>
       </p:ext>
     </p:extLst>
   </p:cSld>
@@ -1795,7 +1853,7 @@
             <a:fld id="{528E7876-5FAB-5445-B77E-737DA6EC0B43}" type="slidenum">
               <a:rPr lang="nb-NO" smtClean="0"/>
               <a:pPr/>
-              <a:t>28</a:t>
+              <a:t>26</a:t>
             </a:fld>
             <a:endParaRPr lang="nb-NO"/>
           </a:p>
@@ -1880,7 +1938,7 @@
             <a:fld id="{528E7876-5FAB-5445-B77E-737DA6EC0B43}" type="slidenum">
               <a:rPr lang="nb-NO" smtClean="0"/>
               <a:pPr/>
-              <a:t>29</a:t>
+              <a:t>27</a:t>
             </a:fld>
             <a:endParaRPr lang="nb-NO"/>
           </a:p>
@@ -1943,6 +2001,24 @@
           <a:bodyPr/>
           <a:lstStyle/>
           <a:p>
+            <a:r>
+              <a:rPr lang="nb-NO" dirty="0" smtClean="0"/>
+              <a:t>Umulig i WebForms</a:t>
+            </a:r>
+          </a:p>
+          <a:p>
+            <a:r>
+              <a:rPr lang="nb-NO" dirty="0" smtClean="0"/>
+              <a:t>Mulig i MVC</a:t>
+            </a:r>
+          </a:p>
+          <a:p>
+            <a:r>
+              <a:rPr lang="nb-NO" dirty="0" smtClean="0"/>
+              <a:t>Fordel i MVC</a:t>
+            </a:r>
+          </a:p>
+          <a:p>
             <a:endParaRPr lang="nb-NO" dirty="0"/>
           </a:p>
         </p:txBody>
@@ -1965,7 +2041,7 @@
             <a:fld id="{528E7876-5FAB-5445-B77E-737DA6EC0B43}" type="slidenum">
               <a:rPr lang="nb-NO" smtClean="0"/>
               <a:pPr/>
-              <a:t>31</a:t>
+              <a:t>28</a:t>
             </a:fld>
             <a:endParaRPr lang="nb-NO"/>
           </a:p>
@@ -2028,6 +2104,58 @@
           <a:bodyPr/>
           <a:lstStyle/>
           <a:p>
+            <a:pPr marL="171450" indent="-171450">
+              <a:buFontTx/>
+              <a:buChar char="-"/>
+            </a:pPr>
+            <a:r>
+              <a:rPr lang="nb-NO" dirty="0" smtClean="0"/>
+              <a:t>Vis post av Login-informasjon</a:t>
+            </a:r>
+            <a:r>
+              <a:rPr lang="nb-NO" baseline="0" dirty="0" smtClean="0"/>
+              <a:t> til en action</a:t>
+            </a:r>
+          </a:p>
+          <a:p>
+            <a:pPr marL="171450" indent="-171450">
+              <a:buFontTx/>
+              <a:buChar char="-"/>
+            </a:pPr>
+            <a:r>
+              <a:rPr lang="nb-NO" baseline="0" dirty="0" smtClean="0"/>
+              <a:t>Lag en enkel implementasjon av FormsAuthenticaiton</a:t>
+            </a:r>
+          </a:p>
+          <a:p>
+            <a:pPr marL="171450" indent="-171450">
+              <a:buFontTx/>
+              <a:buChar char="-"/>
+            </a:pPr>
+            <a:r>
+              <a:rPr lang="nb-NO" baseline="0" dirty="0" smtClean="0"/>
+              <a:t>Lag Secret action på Home controller med [Authorize]</a:t>
+            </a:r>
+          </a:p>
+          <a:p>
+            <a:pPr marL="171450" indent="-171450">
+              <a:buFontTx/>
+              <a:buChar char="-"/>
+            </a:pPr>
+            <a:endParaRPr lang="nb-NO" baseline="0" dirty="0" smtClean="0"/>
+          </a:p>
+          <a:p>
+            <a:pPr marL="171450" indent="-171450">
+              <a:buFontTx/>
+              <a:buChar char="-"/>
+            </a:pPr>
+            <a:endParaRPr lang="nb-NO" baseline="0" dirty="0" smtClean="0"/>
+          </a:p>
+          <a:p>
+            <a:pPr marL="171450" indent="-171450">
+              <a:buFontTx/>
+              <a:buChar char="-"/>
+            </a:pPr>
             <a:endParaRPr lang="nb-NO" dirty="0"/>
           </a:p>
         </p:txBody>
@@ -2050,7 +2178,7 @@
             <a:fld id="{528E7876-5FAB-5445-B77E-737DA6EC0B43}" type="slidenum">
               <a:rPr lang="nb-NO" smtClean="0"/>
               <a:pPr/>
-              <a:t>32</a:t>
+              <a:t>29</a:t>
             </a:fld>
             <a:endParaRPr lang="nb-NO"/>
           </a:p>
@@ -2135,7 +2263,7 @@
             <a:fld id="{528E7876-5FAB-5445-B77E-737DA6EC0B43}" type="slidenum">
               <a:rPr lang="nb-NO" smtClean="0"/>
               <a:pPr/>
-              <a:t>33</a:t>
+              <a:t>31</a:t>
             </a:fld>
             <a:endParaRPr lang="nb-NO"/>
           </a:p>
@@ -2220,7 +2348,7 @@
             <a:fld id="{528E7876-5FAB-5445-B77E-737DA6EC0B43}" type="slidenum">
               <a:rPr lang="nb-NO" smtClean="0"/>
               <a:pPr/>
-              <a:t>34</a:t>
+              <a:t>32</a:t>
             </a:fld>
             <a:endParaRPr lang="nb-NO"/>
           </a:p>
@@ -2283,7 +2411,14 @@
           <a:bodyPr/>
           <a:lstStyle/>
           <a:p>
-            <a:endParaRPr lang="nb-NO" dirty="0"/>
+            <a:r>
+              <a:rPr lang="nb-NO" dirty="0" smtClean="0"/>
+              <a:t>De som trenger det,</a:t>
+            </a:r>
+            <a:r>
+              <a:rPr lang="nb-NO" baseline="0" dirty="0" smtClean="0"/>
+              <a:t> ber om det de trenger og får implementasjonen</a:t>
+            </a:r>
           </a:p>
         </p:txBody>
       </p:sp>
@@ -2305,7 +2440,7 @@
             <a:fld id="{528E7876-5FAB-5445-B77E-737DA6EC0B43}" type="slidenum">
               <a:rPr lang="nb-NO" smtClean="0"/>
               <a:pPr/>
-              <a:t>35</a:t>
+              <a:t>33</a:t>
             </a:fld>
             <a:endParaRPr lang="nb-NO"/>
           </a:p>
@@ -2368,6 +2503,28 @@
           <a:bodyPr/>
           <a:lstStyle/>
           <a:p>
+            <a:r>
+              <a:rPr lang="nb-NO" dirty="0" smtClean="0"/>
+              <a:t>Dra</a:t>
+            </a:r>
+            <a:r>
+              <a:rPr lang="nb-NO" baseline="0" dirty="0" smtClean="0"/>
+              <a:t> ut IAuthenticationProvider</a:t>
+            </a:r>
+          </a:p>
+          <a:p>
+            <a:r>
+              <a:rPr lang="nb-NO" baseline="0" dirty="0" smtClean="0"/>
+              <a:t>Legg inn Ninject</a:t>
+            </a:r>
+          </a:p>
+          <a:p>
+            <a:r>
+              <a:rPr lang="nb-NO" baseline="0" dirty="0" smtClean="0"/>
+              <a:t>Inject AuthenticationProvider inn i UserController</a:t>
+            </a:r>
+          </a:p>
+          <a:p>
             <a:endParaRPr lang="nb-NO" dirty="0"/>
           </a:p>
         </p:txBody>
@@ -2390,7 +2547,7 @@
             <a:fld id="{528E7876-5FAB-5445-B77E-737DA6EC0B43}" type="slidenum">
               <a:rPr lang="nb-NO" smtClean="0"/>
               <a:pPr/>
-              <a:t>36</a:t>
+              <a:t>34</a:t>
             </a:fld>
             <a:endParaRPr lang="nb-NO"/>
           </a:p>
@@ -2475,7 +2632,7 @@
             <a:fld id="{528E7876-5FAB-5445-B77E-737DA6EC0B43}" type="slidenum">
               <a:rPr lang="nb-NO" smtClean="0"/>
               <a:pPr/>
-              <a:t>37</a:t>
+              <a:t>35</a:t>
             </a:fld>
             <a:endParaRPr lang="nb-NO"/>
           </a:p>
@@ -2560,7 +2717,7 @@
             <a:fld id="{528E7876-5FAB-5445-B77E-737DA6EC0B43}" type="slidenum">
               <a:rPr lang="nb-NO" smtClean="0"/>
               <a:pPr/>
-              <a:t>38</a:t>
+              <a:t>36</a:t>
             </a:fld>
             <a:endParaRPr lang="nb-NO"/>
           </a:p>
@@ -2625,17 +2782,7 @@
           <a:p>
             <a:r>
               <a:rPr lang="nb-NO" dirty="0" smtClean="0"/>
-              <a:t>Vis en enkel demo-MVC</a:t>
-            </a:r>
-            <a:r>
-              <a:rPr lang="nb-NO" baseline="0" dirty="0" smtClean="0"/>
-              <a:t> site</a:t>
-            </a:r>
-          </a:p>
-          <a:p>
-            <a:r>
-              <a:rPr lang="nb-NO" baseline="0" dirty="0" smtClean="0"/>
-              <a:t>Vis en controller, en action og et view</a:t>
+              <a:t>HTML+Razor</a:t>
             </a:r>
             <a:endParaRPr lang="nb-NO" dirty="0"/>
           </a:p>
@@ -2659,7 +2806,7 @@
             <a:fld id="{528E7876-5FAB-5445-B77E-737DA6EC0B43}" type="slidenum">
               <a:rPr lang="nb-NO" smtClean="0"/>
               <a:pPr/>
-              <a:t>10</a:t>
+              <a:t>7</a:t>
             </a:fld>
             <a:endParaRPr lang="nb-NO"/>
           </a:p>
@@ -2668,7 +2815,7 @@
     </p:spTree>
     <p:extLst>
       <p:ext uri="{BB962C8B-B14F-4D97-AF65-F5344CB8AC3E}">
-        <p14:creationId xmlns:p14="http://schemas.microsoft.com/office/powerpoint/2010/main" val="3189924498"/>
+        <p14:creationId xmlns:p14="http://schemas.microsoft.com/office/powerpoint/2010/main" val="2990323578"/>
       </p:ext>
     </p:extLst>
   </p:cSld>
@@ -2744,7 +2891,7 @@
             <a:fld id="{528E7876-5FAB-5445-B77E-737DA6EC0B43}" type="slidenum">
               <a:rPr lang="nb-NO" smtClean="0"/>
               <a:pPr/>
-              <a:t>39</a:t>
+              <a:t>37</a:t>
             </a:fld>
             <a:endParaRPr lang="nb-NO"/>
           </a:p>
@@ -2807,6 +2954,22 @@
           <a:bodyPr/>
           <a:lstStyle/>
           <a:p>
+            <a:r>
+              <a:rPr lang="nb-NO" dirty="0" smtClean="0"/>
+              <a:t>Lag noen enhetstester</a:t>
+            </a:r>
+            <a:r>
+              <a:rPr lang="nb-NO" baseline="0" dirty="0" smtClean="0"/>
+              <a:t> som mocker opp og tester AuthenticationProvider</a:t>
+            </a:r>
+          </a:p>
+          <a:p>
+            <a:r>
+              <a:rPr lang="nb-NO" baseline="0" dirty="0" smtClean="0"/>
+              <a:t>Test at Actions returnerer det vi forventer</a:t>
+            </a:r>
+          </a:p>
+          <a:p>
             <a:endParaRPr lang="nb-NO" dirty="0"/>
           </a:p>
         </p:txBody>
@@ -2829,7 +2992,7 @@
             <a:fld id="{528E7876-5FAB-5445-B77E-737DA6EC0B43}" type="slidenum">
               <a:rPr lang="nb-NO" smtClean="0"/>
               <a:pPr/>
-              <a:t>40</a:t>
+              <a:t>38</a:t>
             </a:fld>
             <a:endParaRPr lang="nb-NO"/>
           </a:p>
@@ -2914,7 +3077,7 @@
             <a:fld id="{528E7876-5FAB-5445-B77E-737DA6EC0B43}" type="slidenum">
               <a:rPr lang="nb-NO" smtClean="0"/>
               <a:pPr/>
-              <a:t>41</a:t>
+              <a:t>39</a:t>
             </a:fld>
             <a:endParaRPr lang="nb-NO"/>
           </a:p>
@@ -2999,7 +3162,7 @@
             <a:fld id="{528E7876-5FAB-5445-B77E-737DA6EC0B43}" type="slidenum">
               <a:rPr lang="nb-NO" smtClean="0"/>
               <a:pPr/>
-              <a:t>42</a:t>
+              <a:t>40</a:t>
             </a:fld>
             <a:endParaRPr lang="nb-NO"/>
           </a:p>
@@ -3062,6 +3225,14 @@
           <a:bodyPr/>
           <a:lstStyle/>
           <a:p>
+            <a:r>
+              <a:rPr lang="nb-NO" dirty="0" smtClean="0"/>
+              <a:t>Models kan ofte være litt misvisende.</a:t>
+            </a:r>
+            <a:r>
+              <a:rPr lang="nb-NO" baseline="0" dirty="0" smtClean="0"/>
+              <a:t> Den burde kanskje heller hete ViewModels</a:t>
+            </a:r>
             <a:endParaRPr lang="nb-NO" dirty="0"/>
           </a:p>
         </p:txBody>
@@ -3084,7 +3255,7 @@
             <a:fld id="{528E7876-5FAB-5445-B77E-737DA6EC0B43}" type="slidenum">
               <a:rPr lang="nb-NO" smtClean="0"/>
               <a:pPr/>
-              <a:t>43</a:t>
+              <a:t>41</a:t>
             </a:fld>
             <a:endParaRPr lang="nb-NO"/>
           </a:p>
@@ -3147,6 +3318,20 @@
           <a:bodyPr/>
           <a:lstStyle/>
           <a:p>
+            <a:r>
+              <a:rPr lang="nb-NO" dirty="0" smtClean="0"/>
+              <a:t>Holde oss unna masse @foreach osv i views</a:t>
+            </a:r>
+          </a:p>
+          <a:p>
+            <a:r>
+              <a:rPr lang="nb-NO" dirty="0" smtClean="0"/>
+              <a:t>Bruk heller @Html.DisplayFor, @Html.DisplayForModel</a:t>
+            </a:r>
+            <a:r>
+              <a:rPr lang="nb-NO" baseline="0" dirty="0" smtClean="0"/>
+              <a:t> etc.</a:t>
+            </a:r>
             <a:endParaRPr lang="nb-NO" dirty="0"/>
           </a:p>
         </p:txBody>
@@ -3169,7 +3354,7 @@
             <a:fld id="{528E7876-5FAB-5445-B77E-737DA6EC0B43}" type="slidenum">
               <a:rPr lang="nb-NO" smtClean="0"/>
               <a:pPr/>
-              <a:t>44</a:t>
+              <a:t>42</a:t>
             </a:fld>
             <a:endParaRPr lang="nb-NO"/>
           </a:p>
@@ -3232,6 +3417,60 @@
           <a:bodyPr/>
           <a:lstStyle/>
           <a:p>
+            <a:r>
+              <a:rPr lang="nb-NO" dirty="0" smtClean="0"/>
+              <a:t>Businesslogikk har somregel ikke noe i en controller-action å gjøre. </a:t>
+            </a:r>
+          </a:p>
+          <a:p>
+            <a:r>
+              <a:rPr lang="nb-NO" dirty="0" smtClean="0"/>
+              <a:t>Det fører bare til:</a:t>
+            </a:r>
+          </a:p>
+          <a:p>
+            <a:pPr marL="171450" indent="-171450">
+              <a:buFontTx/>
+              <a:buChar char="-"/>
+            </a:pPr>
+            <a:r>
+              <a:rPr lang="nb-NO" dirty="0" smtClean="0"/>
+              <a:t>dårligere testbarhet</a:t>
+            </a:r>
+          </a:p>
+          <a:p>
+            <a:pPr marL="171450" indent="-171450">
+              <a:buFontTx/>
+              <a:buChar char="-"/>
+            </a:pPr>
+            <a:r>
+              <a:rPr lang="nb-NO" dirty="0" smtClean="0"/>
+              <a:t>Vanskeligere</a:t>
+            </a:r>
+            <a:r>
+              <a:rPr lang="nb-NO" baseline="0" dirty="0" smtClean="0"/>
+              <a:t> å vedlikeholde</a:t>
+            </a:r>
+          </a:p>
+          <a:p>
+            <a:pPr marL="171450" indent="-171450">
+              <a:buFontTx/>
+              <a:buChar char="-"/>
+            </a:pPr>
+            <a:r>
+              <a:rPr lang="nb-NO" baseline="0" dirty="0" smtClean="0"/>
+              <a:t>Mer fragil kode</a:t>
+            </a:r>
+          </a:p>
+          <a:p>
+            <a:pPr marL="171450" indent="-171450">
+              <a:buFontTx/>
+              <a:buChar char="-"/>
+            </a:pPr>
+            <a:r>
+              <a:rPr lang="nb-NO" baseline="0" dirty="0" smtClean="0"/>
+              <a:t>Mer repetetiv kode</a:t>
+            </a:r>
             <a:endParaRPr lang="nb-NO" dirty="0"/>
           </a:p>
         </p:txBody>
@@ -3254,7 +3493,7 @@
             <a:fld id="{528E7876-5FAB-5445-B77E-737DA6EC0B43}" type="slidenum">
               <a:rPr lang="nb-NO" smtClean="0"/>
               <a:pPr/>
-              <a:t>45</a:t>
+              <a:t>43</a:t>
             </a:fld>
             <a:endParaRPr lang="nb-NO"/>
           </a:p>
@@ -3317,6 +3556,14 @@
           <a:bodyPr/>
           <a:lstStyle/>
           <a:p>
+            <a:r>
+              <a:rPr lang="nb-NO" dirty="0" smtClean="0"/>
+              <a:t>ViewModeller</a:t>
+            </a:r>
+            <a:r>
+              <a:rPr lang="nb-NO" baseline="0" dirty="0" smtClean="0"/>
+              <a:t> bør ha et navn som reflekterer viewet det hører til. Dette fører igjen til at Viewet ofte navngis i forhold til hvilke data det skal presentere. (URL kan uansett SEOifiseres vha routes)</a:t>
+            </a:r>
             <a:endParaRPr lang="nb-NO" dirty="0"/>
           </a:p>
         </p:txBody>
@@ -3339,7 +3586,7 @@
             <a:fld id="{528E7876-5FAB-5445-B77E-737DA6EC0B43}" type="slidenum">
               <a:rPr lang="nb-NO" smtClean="0"/>
               <a:pPr/>
-              <a:t>46</a:t>
+              <a:t>44</a:t>
             </a:fld>
             <a:endParaRPr lang="nb-NO"/>
           </a:p>
@@ -3402,6 +3649,14 @@
           <a:bodyPr/>
           <a:lstStyle/>
           <a:p>
+            <a:r>
+              <a:rPr lang="nb-NO" dirty="0" smtClean="0"/>
+              <a:t>Del opp Viewmodellene i logiske</a:t>
+            </a:r>
+            <a:r>
+              <a:rPr lang="nb-NO" baseline="0" dirty="0" smtClean="0"/>
+              <a:t> og fornuftige biter. Det er ingenting i veien for at en ViewModell kan inneholde referanser til andre ViewModeller som collections. Det fører til gjenbrukbare viewmodels og mer ryddig kode.</a:t>
+            </a:r>
             <a:endParaRPr lang="nb-NO" dirty="0"/>
           </a:p>
         </p:txBody>
@@ -3424,7 +3679,7 @@
             <a:fld id="{528E7876-5FAB-5445-B77E-737DA6EC0B43}" type="slidenum">
               <a:rPr lang="nb-NO" smtClean="0"/>
               <a:pPr/>
-              <a:t>48</a:t>
+              <a:t>45</a:t>
             </a:fld>
             <a:endParaRPr lang="nb-NO"/>
           </a:p>
@@ -3487,6 +3742,20 @@
           <a:bodyPr/>
           <a:lstStyle/>
           <a:p>
+            <a:r>
+              <a:rPr lang="nb-NO" dirty="0" smtClean="0"/>
+              <a:t>IKKE PUTT LOGIKK</a:t>
+            </a:r>
+            <a:r>
+              <a:rPr lang="nb-NO" baseline="0" dirty="0" smtClean="0"/>
+              <a:t> I GET/SET</a:t>
+            </a:r>
+          </a:p>
+          <a:p>
+            <a:r>
+              <a:rPr lang="nb-NO" baseline="0" dirty="0" smtClean="0"/>
+              <a:t>Viewmodeller skal ikke ha noe forhold til hvorfor dataene er som de er. De skal kun være et mellomlagringssted, slik at Viewet kan presentere/poste og controlleren kan agere på bakgrunn av dataene.</a:t>
+            </a:r>
             <a:endParaRPr lang="nb-NO" dirty="0"/>
           </a:p>
         </p:txBody>
@@ -3509,7 +3778,7 @@
             <a:fld id="{528E7876-5FAB-5445-B77E-737DA6EC0B43}" type="slidenum">
               <a:rPr lang="nb-NO" smtClean="0"/>
               <a:pPr/>
-              <a:t>49</a:t>
+              <a:t>46</a:t>
             </a:fld>
             <a:endParaRPr lang="nb-NO"/>
           </a:p>
@@ -3572,7 +3841,62 @@
           <a:bodyPr/>
           <a:lstStyle/>
           <a:p>
-            <a:endParaRPr lang="nb-NO" dirty="0"/>
+            <a:r>
+              <a:rPr lang="nb-NO" dirty="0" smtClean="0"/>
+              <a:t>Controller</a:t>
+            </a:r>
+            <a:r>
+              <a:rPr lang="nb-NO" baseline="0" dirty="0" smtClean="0"/>
+              <a:t> har ansvar for å dytte et resultat ut til Responsen</a:t>
+            </a:r>
+          </a:p>
+          <a:p>
+            <a:pPr marL="0" marR="0" indent="0" algn="l" defTabSz="457200" rtl="0" eaLnBrk="1" fontAlgn="auto" latinLnBrk="0" hangingPunct="1">
+              <a:lnSpc>
+                <a:spcPct val="100000"/>
+              </a:lnSpc>
+              <a:spcBef>
+                <a:spcPts val="0"/>
+              </a:spcBef>
+              <a:spcAft>
+                <a:spcPts val="0"/>
+              </a:spcAft>
+              <a:buClrTx/>
+              <a:buSzTx/>
+              <a:buFontTx/>
+              <a:buNone/>
+              <a:tabLst/>
+              <a:defRPr/>
+            </a:pPr>
+            <a:r>
+              <a:rPr lang="nb-NO" baseline="0" dirty="0" smtClean="0"/>
+              <a:t>ActionResult</a:t>
+            </a:r>
+            <a:endParaRPr lang="nb-NO" dirty="0" smtClean="0"/>
+          </a:p>
+          <a:p>
+            <a:r>
+              <a:rPr lang="nb-NO" baseline="0" dirty="0" smtClean="0"/>
+              <a:t>JsonResult</a:t>
+            </a:r>
+          </a:p>
+          <a:p>
+            <a:r>
+              <a:rPr lang="nb-NO" baseline="0" dirty="0" smtClean="0"/>
+              <a:t>ViewResult</a:t>
+            </a:r>
+          </a:p>
+          <a:p>
+            <a:r>
+              <a:rPr lang="nb-NO" baseline="0" dirty="0" smtClean="0"/>
+              <a:t>FileResult</a:t>
+            </a:r>
+          </a:p>
+          <a:p>
+            <a:r>
+              <a:rPr lang="nb-NO" baseline="0" dirty="0" smtClean="0"/>
+              <a:t>Etc...</a:t>
+            </a:r>
           </a:p>
         </p:txBody>
       </p:sp>
@@ -3594,7 +3918,96 @@
             <a:fld id="{528E7876-5FAB-5445-B77E-737DA6EC0B43}" type="slidenum">
               <a:rPr lang="nb-NO" smtClean="0"/>
               <a:pPr/>
-              <a:t>11</a:t>
+              <a:t>8</a:t>
+            </a:fld>
+            <a:endParaRPr lang="nb-NO"/>
+          </a:p>
+        </p:txBody>
+      </p:sp>
+    </p:spTree>
+    <p:extLst>
+      <p:ext uri="{BB962C8B-B14F-4D97-AF65-F5344CB8AC3E}">
+        <p14:creationId xmlns:p14="http://schemas.microsoft.com/office/powerpoint/2010/main" val="1300740326"/>
+      </p:ext>
+    </p:extLst>
+  </p:cSld>
+  <p:clrMapOvr>
+    <a:masterClrMapping/>
+  </p:clrMapOvr>
+</p:notes>
+</file>
+
+<file path=ppt/notesSlides/notesSlide40.xml><?xml version="1.0" encoding="utf-8"?>
+<p:notes xmlns:a="http://schemas.openxmlformats.org/drawingml/2006/main" xmlns:r="http://schemas.openxmlformats.org/officeDocument/2006/relationships" xmlns:p="http://schemas.openxmlformats.org/presentationml/2006/main">
+  <p:cSld>
+    <p:spTree>
+      <p:nvGrpSpPr>
+        <p:cNvPr id="1" name=""/>
+        <p:cNvGrpSpPr/>
+        <p:nvPr/>
+      </p:nvGrpSpPr>
+      <p:grpSpPr>
+        <a:xfrm>
+          <a:off x="0" y="0"/>
+          <a:ext cx="0" cy="0"/>
+          <a:chOff x="0" y="0"/>
+          <a:chExt cx="0" cy="0"/>
+        </a:xfrm>
+      </p:grpSpPr>
+      <p:sp>
+        <p:nvSpPr>
+          <p:cNvPr id="2" name="Slide Image Placeholder 1"/>
+          <p:cNvSpPr>
+            <a:spLocks noGrp="1" noRot="1" noChangeAspect="1"/>
+          </p:cNvSpPr>
+          <p:nvPr>
+            <p:ph type="sldImg"/>
+          </p:nvPr>
+        </p:nvSpPr>
+        <p:spPr/>
+      </p:sp>
+      <p:sp>
+        <p:nvSpPr>
+          <p:cNvPr id="3" name="Notes Placeholder 2"/>
+          <p:cNvSpPr>
+            <a:spLocks noGrp="1"/>
+          </p:cNvSpPr>
+          <p:nvPr>
+            <p:ph type="body" idx="1"/>
+          </p:nvPr>
+        </p:nvSpPr>
+        <p:spPr/>
+        <p:txBody>
+          <a:bodyPr/>
+          <a:lstStyle/>
+          <a:p>
+            <a:r>
+              <a:rPr lang="nb-NO" smtClean="0"/>
+              <a:t>Har vi tid til overs?</a:t>
+            </a:r>
+            <a:endParaRPr lang="nb-NO" dirty="0"/>
+          </a:p>
+        </p:txBody>
+      </p:sp>
+      <p:sp>
+        <p:nvSpPr>
+          <p:cNvPr id="4" name="Slide Number Placeholder 3"/>
+          <p:cNvSpPr>
+            <a:spLocks noGrp="1"/>
+          </p:cNvSpPr>
+          <p:nvPr>
+            <p:ph type="sldNum" sz="quarter" idx="10"/>
+          </p:nvPr>
+        </p:nvSpPr>
+        <p:spPr/>
+        <p:txBody>
+          <a:bodyPr/>
+          <a:lstStyle/>
+          <a:p>
+            <a:fld id="{528E7876-5FAB-5445-B77E-737DA6EC0B43}" type="slidenum">
+              <a:rPr lang="nb-NO" smtClean="0"/>
+              <a:pPr/>
+              <a:t>48</a:t>
             </a:fld>
             <a:endParaRPr lang="nb-NO"/>
           </a:p>
@@ -3613,7 +4026,92 @@
 </p:notes>
 </file>
 
-<file path=ppt/notesSlides/notesSlide40.xml><?xml version="1.0" encoding="utf-8"?>
+<file path=ppt/notesSlides/notesSlide41.xml><?xml version="1.0" encoding="utf-8"?>
+<p:notes xmlns:a="http://schemas.openxmlformats.org/drawingml/2006/main" xmlns:r="http://schemas.openxmlformats.org/officeDocument/2006/relationships" xmlns:p="http://schemas.openxmlformats.org/presentationml/2006/main">
+  <p:cSld>
+    <p:spTree>
+      <p:nvGrpSpPr>
+        <p:cNvPr id="1" name=""/>
+        <p:cNvGrpSpPr/>
+        <p:nvPr/>
+      </p:nvGrpSpPr>
+      <p:grpSpPr>
+        <a:xfrm>
+          <a:off x="0" y="0"/>
+          <a:ext cx="0" cy="0"/>
+          <a:chOff x="0" y="0"/>
+          <a:chExt cx="0" cy="0"/>
+        </a:xfrm>
+      </p:grpSpPr>
+      <p:sp>
+        <p:nvSpPr>
+          <p:cNvPr id="2" name="Slide Image Placeholder 1"/>
+          <p:cNvSpPr>
+            <a:spLocks noGrp="1" noRot="1" noChangeAspect="1"/>
+          </p:cNvSpPr>
+          <p:nvPr>
+            <p:ph type="sldImg"/>
+          </p:nvPr>
+        </p:nvSpPr>
+        <p:spPr/>
+      </p:sp>
+      <p:sp>
+        <p:nvSpPr>
+          <p:cNvPr id="3" name="Notes Placeholder 2"/>
+          <p:cNvSpPr>
+            <a:spLocks noGrp="1"/>
+          </p:cNvSpPr>
+          <p:nvPr>
+            <p:ph type="body" idx="1"/>
+          </p:nvPr>
+        </p:nvSpPr>
+        <p:spPr/>
+        <p:txBody>
+          <a:bodyPr/>
+          <a:lstStyle/>
+          <a:p>
+            <a:endParaRPr lang="nb-NO" dirty="0"/>
+          </a:p>
+        </p:txBody>
+      </p:sp>
+      <p:sp>
+        <p:nvSpPr>
+          <p:cNvPr id="4" name="Slide Number Placeholder 3"/>
+          <p:cNvSpPr>
+            <a:spLocks noGrp="1"/>
+          </p:cNvSpPr>
+          <p:nvPr>
+            <p:ph type="sldNum" sz="quarter" idx="10"/>
+          </p:nvPr>
+        </p:nvSpPr>
+        <p:spPr/>
+        <p:txBody>
+          <a:bodyPr/>
+          <a:lstStyle/>
+          <a:p>
+            <a:fld id="{528E7876-5FAB-5445-B77E-737DA6EC0B43}" type="slidenum">
+              <a:rPr lang="nb-NO" smtClean="0"/>
+              <a:pPr/>
+              <a:t>49</a:t>
+            </a:fld>
+            <a:endParaRPr lang="nb-NO"/>
+          </a:p>
+        </p:txBody>
+      </p:sp>
+    </p:spTree>
+    <p:extLst>
+      <p:ext uri="{BB962C8B-B14F-4D97-AF65-F5344CB8AC3E}">
+        <p14:creationId xmlns:p14="http://schemas.microsoft.com/office/powerpoint/2010/main" val="3189924498"/>
+      </p:ext>
+    </p:extLst>
+  </p:cSld>
+  <p:clrMapOvr>
+    <a:masterClrMapping/>
+  </p:clrMapOvr>
+</p:notes>
+</file>
+
+<file path=ppt/notesSlides/notesSlide42.xml><?xml version="1.0" encoding="utf-8"?>
 <p:notes xmlns:a="http://schemas.openxmlformats.org/drawingml/2006/main" xmlns:r="http://schemas.openxmlformats.org/officeDocument/2006/relationships" xmlns:p="http://schemas.openxmlformats.org/presentationml/2006/main">
   <p:cSld>
     <p:spTree>
@@ -3742,6 +4240,20 @@
           <a:bodyPr/>
           <a:lstStyle/>
           <a:p>
+            <a:r>
+              <a:rPr lang="nb-NO" dirty="0" smtClean="0"/>
+              <a:t>Vis en enkel demo-MVC</a:t>
+            </a:r>
+            <a:r>
+              <a:rPr lang="nb-NO" baseline="0" dirty="0" smtClean="0"/>
+              <a:t> site</a:t>
+            </a:r>
+          </a:p>
+          <a:p>
+            <a:r>
+              <a:rPr lang="nb-NO" baseline="0" dirty="0" smtClean="0"/>
+              <a:t>Vis en controller, en action og et view</a:t>
+            </a:r>
             <a:endParaRPr lang="nb-NO" dirty="0"/>
           </a:p>
         </p:txBody>
@@ -3764,7 +4276,7 @@
             <a:fld id="{528E7876-5FAB-5445-B77E-737DA6EC0B43}" type="slidenum">
               <a:rPr lang="nb-NO" smtClean="0"/>
               <a:pPr/>
-              <a:t>12</a:t>
+              <a:t>10</a:t>
             </a:fld>
             <a:endParaRPr lang="nb-NO"/>
           </a:p>
@@ -3849,7 +4361,7 @@
             <a:fld id="{528E7876-5FAB-5445-B77E-737DA6EC0B43}" type="slidenum">
               <a:rPr lang="nb-NO" smtClean="0"/>
               <a:pPr/>
-              <a:t>13</a:t>
+              <a:t>11</a:t>
             </a:fld>
             <a:endParaRPr lang="nb-NO"/>
           </a:p>
@@ -3912,6 +4424,24 @@
           <a:bodyPr/>
           <a:lstStyle/>
           <a:p>
+            <a:r>
+              <a:rPr lang="nb-NO" dirty="0" smtClean="0"/>
+              <a:t>Ryddig HTML</a:t>
+            </a:r>
+          </a:p>
+          <a:p>
+            <a:r>
+              <a:rPr lang="nb-NO" dirty="0" smtClean="0"/>
+              <a:t>Ikke merkelige ID-genereringer</a:t>
+            </a:r>
+          </a:p>
+          <a:p>
+            <a:r>
+              <a:rPr lang="nb-NO" dirty="0" smtClean="0"/>
+              <a:t>WYSIWYG</a:t>
+            </a:r>
+          </a:p>
+          <a:p>
             <a:endParaRPr lang="nb-NO" dirty="0"/>
           </a:p>
         </p:txBody>
@@ -3934,7 +4464,7 @@
             <a:fld id="{528E7876-5FAB-5445-B77E-737DA6EC0B43}" type="slidenum">
               <a:rPr lang="nb-NO" smtClean="0"/>
               <a:pPr/>
-              <a:t>14</a:t>
+              <a:t>12</a:t>
             </a:fld>
             <a:endParaRPr lang="nb-NO"/>
           </a:p>
@@ -4019,7 +4549,7 @@
             <a:fld id="{528E7876-5FAB-5445-B77E-737DA6EC0B43}" type="slidenum">
               <a:rPr lang="nb-NO" smtClean="0"/>
               <a:pPr/>
-              <a:t>15</a:t>
+              <a:t>13</a:t>
             </a:fld>
             <a:endParaRPr lang="nb-NO"/>
           </a:p>
@@ -4104,7 +4634,7 @@
             <a:fld id="{528E7876-5FAB-5445-B77E-737DA6EC0B43}" type="slidenum">
               <a:rPr lang="nb-NO" smtClean="0"/>
               <a:pPr/>
-              <a:t>16</a:t>
+              <a:t>14</a:t>
             </a:fld>
             <a:endParaRPr lang="nb-NO"/>
           </a:p>
@@ -10004,7 +10534,7 @@
             <a:fld id="{A505A5D1-9685-014A-9EF8-71CC65F429DA}" type="datetime1">
               <a:rPr lang="nb-NO"/>
               <a:pPr/>
-              <a:t>09.09.2012</a:t>
+              <a:t>10.09.2012</a:t>
             </a:fld>
             <a:endParaRPr lang="nn-NO"/>
           </a:p>
@@ -10694,7 +11224,7 @@
             <a:fld id="{E7153C23-280C-6C4E-BD6E-2850A1F48140}" type="datetime1">
               <a:rPr lang="nb-NO"/>
               <a:pPr/>
-              <a:t>09.09.2012</a:t>
+              <a:t>10.09.2012</a:t>
             </a:fld>
             <a:endParaRPr lang="nn-NO"/>
           </a:p>
@@ -11019,7 +11549,7 @@
             <a:fld id="{13B601EC-FACD-FC4F-9669-00AB4CF8778B}" type="datetime1">
               <a:rPr lang="nb-NO"/>
               <a:pPr/>
-              <a:t>09.09.2012</a:t>
+              <a:t>10.09.2012</a:t>
             </a:fld>
             <a:endParaRPr lang="nn-NO"/>
           </a:p>
@@ -11324,7 +11854,7 @@
             <a:fld id="{901627AB-7A7F-AD40-80AE-71016A4942D9}" type="datetime1">
               <a:rPr lang="nb-NO"/>
               <a:pPr/>
-              <a:t>09.09.2012</a:t>
+              <a:t>10.09.2012</a:t>
             </a:fld>
             <a:endParaRPr lang="nn-NO"/>
           </a:p>
@@ -11747,7 +12277,7 @@
             <a:fld id="{567FA10D-157E-5D4C-A511-919445BACF49}" type="datetime1">
               <a:rPr lang="nb-NO"/>
               <a:pPr/>
-              <a:t>09.09.2012</a:t>
+              <a:t>10.09.2012</a:t>
             </a:fld>
             <a:endParaRPr lang="nn-NO"/>
           </a:p>
@@ -11938,7 +12468,7 @@
             <a:fld id="{AF9809C3-0F8F-3340-B383-31BB0050389D}" type="datetime1">
               <a:rPr lang="nb-NO"/>
               <a:pPr/>
-              <a:t>09.09.2012</a:t>
+              <a:t>10.09.2012</a:t>
             </a:fld>
             <a:endParaRPr lang="nn-NO"/>
           </a:p>
@@ -12226,7 +12756,7 @@
             <a:fld id="{FF90C9FC-C727-6243-BD9D-4BAF5B3503CD}" type="datetime1">
               <a:rPr lang="nb-NO"/>
               <a:pPr/>
-              <a:t>09.09.2012</a:t>
+              <a:t>10.09.2012</a:t>
             </a:fld>
             <a:endParaRPr lang="nn-NO"/>
           </a:p>
@@ -12488,7 +13018,7 @@
             <a:fld id="{424710AA-3AA4-8A45-80E0-C3CD96381010}" type="datetime1">
               <a:rPr lang="nb-NO"/>
               <a:pPr/>
-              <a:t>09.09.2012</a:t>
+              <a:t>10.09.2012</a:t>
             </a:fld>
             <a:endParaRPr lang="nn-NO"/>
           </a:p>
@@ -13269,7 +13799,7 @@
             <a:fld id="{E7153C23-280C-6C4E-BD6E-2850A1F48140}" type="datetime1">
               <a:rPr lang="nb-NO" smtClean="0"/>
               <a:pPr/>
-              <a:t>09.09.2012</a:t>
+              <a:t>10.09.2012</a:t>
             </a:fld>
             <a:endParaRPr lang="nn-NO"/>
           </a:p>
@@ -13405,7 +13935,7 @@
             <a:fld id="{E7153C23-280C-6C4E-BD6E-2850A1F48140}" type="datetime1">
               <a:rPr lang="nb-NO" smtClean="0"/>
               <a:pPr/>
-              <a:t>09.09.2012</a:t>
+              <a:t>10.09.2012</a:t>
             </a:fld>
             <a:endParaRPr lang="nn-NO"/>
           </a:p>
@@ -13541,7 +14071,7 @@
             <a:fld id="{E7153C23-280C-6C4E-BD6E-2850A1F48140}" type="datetime1">
               <a:rPr lang="nb-NO" smtClean="0"/>
               <a:pPr/>
-              <a:t>09.09.2012</a:t>
+              <a:t>10.09.2012</a:t>
             </a:fld>
             <a:endParaRPr lang="nn-NO"/>
           </a:p>
@@ -13718,7 +14248,7 @@
             <a:fld id="{E7153C23-280C-6C4E-BD6E-2850A1F48140}" type="datetime1">
               <a:rPr lang="nb-NO" smtClean="0"/>
               <a:pPr/>
-              <a:t>09.09.2012</a:t>
+              <a:t>10.09.2012</a:t>
             </a:fld>
             <a:endParaRPr lang="nn-NO"/>
           </a:p>
@@ -13884,7 +14414,7 @@
             <a:fld id="{E7153C23-280C-6C4E-BD6E-2850A1F48140}" type="datetime1">
               <a:rPr lang="nb-NO" smtClean="0"/>
               <a:pPr/>
-              <a:t>09.09.2012</a:t>
+              <a:t>10.09.2012</a:t>
             </a:fld>
             <a:endParaRPr lang="nn-NO"/>
           </a:p>
@@ -14061,7 +14591,7 @@
             <a:fld id="{E7153C23-280C-6C4E-BD6E-2850A1F48140}" type="datetime1">
               <a:rPr lang="nb-NO" smtClean="0"/>
               <a:pPr/>
-              <a:t>09.09.2012</a:t>
+              <a:t>10.09.2012</a:t>
             </a:fld>
             <a:endParaRPr lang="nn-NO"/>
           </a:p>
@@ -14168,7 +14698,7 @@
             <a:fld id="{E7153C23-280C-6C4E-BD6E-2850A1F48140}" type="datetime1">
               <a:rPr lang="nb-NO" smtClean="0"/>
               <a:pPr/>
-              <a:t>09.09.2012</a:t>
+              <a:t>10.09.2012</a:t>
             </a:fld>
             <a:endParaRPr lang="nn-NO"/>
           </a:p>
@@ -14232,7 +14762,7 @@
           <a:bodyPr/>
           <a:lstStyle/>
           <a:p>
-            <a:endParaRPr lang="nb-NO"/>
+            <a:endParaRPr lang="nb-NO" dirty="0"/>
           </a:p>
         </p:txBody>
       </p:sp>
@@ -14453,7 +14983,7 @@
             <a:fld id="{E7153C23-280C-6C4E-BD6E-2850A1F48140}" type="datetime1">
               <a:rPr lang="nb-NO" smtClean="0"/>
               <a:pPr/>
-              <a:t>09.09.2012</a:t>
+              <a:t>10.09.2012</a:t>
             </a:fld>
             <a:endParaRPr lang="nn-NO"/>
           </a:p>
@@ -14630,7 +15160,7 @@
             <a:fld id="{E7153C23-280C-6C4E-BD6E-2850A1F48140}" type="datetime1">
               <a:rPr lang="nb-NO" smtClean="0"/>
               <a:pPr/>
-              <a:t>09.09.2012</a:t>
+              <a:t>10.09.2012</a:t>
             </a:fld>
             <a:endParaRPr lang="nn-NO"/>
           </a:p>
@@ -14766,7 +15296,7 @@
             <a:fld id="{E7153C23-280C-6C4E-BD6E-2850A1F48140}" type="datetime1">
               <a:rPr lang="nb-NO" smtClean="0"/>
               <a:pPr/>
-              <a:t>09.09.2012</a:t>
+              <a:t>10.09.2012</a:t>
             </a:fld>
             <a:endParaRPr lang="nn-NO"/>
           </a:p>
@@ -14901,7 +15431,6 @@
               <a:rPr lang="nb-NO" dirty="0" smtClean="0"/>
               <a:t>Del 1 – Introduksjon til MVC</a:t>
             </a:r>
-            <a:endParaRPr lang="nb-NO" dirty="0" smtClean="0"/>
           </a:p>
           <a:p>
             <a:pPr lvl="0"/>
@@ -14916,7 +15445,6 @@
               <a:rPr lang="nb-NO" dirty="0" smtClean="0"/>
               <a:t>Del 3 – Avanserte teknikker, testing og best practices</a:t>
             </a:r>
-            <a:endParaRPr lang="nb-NO" dirty="0" smtClean="0"/>
           </a:p>
           <a:p>
             <a:r>
@@ -14948,7 +15476,7 @@
             <a:fld id="{E7153C23-280C-6C4E-BD6E-2850A1F48140}" type="datetime1">
               <a:rPr lang="nb-NO" smtClean="0"/>
               <a:pPr/>
-              <a:t>09.09.2012</a:t>
+              <a:t>10.09.2012</a:t>
             </a:fld>
             <a:endParaRPr lang="nb-NO"/>
           </a:p>
@@ -15099,7 +15627,7 @@
             <a:fld id="{E7153C23-280C-6C4E-BD6E-2850A1F48140}" type="datetime1">
               <a:rPr lang="nb-NO" smtClean="0"/>
               <a:pPr/>
-              <a:t>09.09.2012</a:t>
+              <a:t>10.09.2012</a:t>
             </a:fld>
             <a:endParaRPr lang="nn-NO"/>
           </a:p>
@@ -15235,7 +15763,7 @@
             <a:fld id="{E7153C23-280C-6C4E-BD6E-2850A1F48140}" type="datetime1">
               <a:rPr lang="nb-NO" smtClean="0"/>
               <a:pPr/>
-              <a:t>09.09.2012</a:t>
+              <a:t>10.09.2012</a:t>
             </a:fld>
             <a:endParaRPr lang="nn-NO"/>
           </a:p>
@@ -15412,7 +15940,7 @@
             <a:fld id="{E7153C23-280C-6C4E-BD6E-2850A1F48140}" type="datetime1">
               <a:rPr lang="nb-NO" smtClean="0"/>
               <a:pPr/>
-              <a:t>09.09.2012</a:t>
+              <a:t>10.09.2012</a:t>
             </a:fld>
             <a:endParaRPr lang="nn-NO"/>
           </a:p>
@@ -15548,7 +16076,7 @@
             <a:fld id="{E7153C23-280C-6C4E-BD6E-2850A1F48140}" type="datetime1">
               <a:rPr lang="nb-NO" smtClean="0"/>
               <a:pPr/>
-              <a:t>09.09.2012</a:t>
+              <a:t>10.09.2012</a:t>
             </a:fld>
             <a:endParaRPr lang="nn-NO"/>
           </a:p>
@@ -15713,7 +16241,7 @@
             <a:fld id="{E7153C23-280C-6C4E-BD6E-2850A1F48140}" type="datetime1">
               <a:rPr lang="nb-NO" smtClean="0"/>
               <a:pPr/>
-              <a:t>09.09.2012</a:t>
+              <a:t>10.09.2012</a:t>
             </a:fld>
             <a:endParaRPr lang="nn-NO"/>
           </a:p>
@@ -15849,7 +16377,7 @@
             <a:fld id="{E7153C23-280C-6C4E-BD6E-2850A1F48140}" type="datetime1">
               <a:rPr lang="nb-NO" smtClean="0"/>
               <a:pPr/>
-              <a:t>09.09.2012</a:t>
+              <a:t>10.09.2012</a:t>
             </a:fld>
             <a:endParaRPr lang="nn-NO"/>
           </a:p>
@@ -15991,7 +16519,7 @@
             <a:fld id="{E7153C23-280C-6C4E-BD6E-2850A1F48140}" type="datetime1">
               <a:rPr lang="nb-NO" smtClean="0"/>
               <a:pPr/>
-              <a:t>09.09.2012</a:t>
+              <a:t>10.09.2012</a:t>
             </a:fld>
             <a:endParaRPr lang="nn-NO"/>
           </a:p>
@@ -16139,7 +16667,7 @@
             <a:fld id="{E7153C23-280C-6C4E-BD6E-2850A1F48140}" type="datetime1">
               <a:rPr lang="nb-NO" smtClean="0"/>
               <a:pPr/>
-              <a:t>09.09.2012</a:t>
+              <a:t>10.09.2012</a:t>
             </a:fld>
             <a:endParaRPr lang="nn-NO"/>
           </a:p>
@@ -16275,7 +16803,7 @@
             <a:fld id="{E7153C23-280C-6C4E-BD6E-2850A1F48140}" type="datetime1">
               <a:rPr lang="nb-NO" smtClean="0"/>
               <a:pPr/>
-              <a:t>09.09.2012</a:t>
+              <a:t>10.09.2012</a:t>
             </a:fld>
             <a:endParaRPr lang="nn-NO"/>
           </a:p>
@@ -16411,7 +16939,7 @@
             <a:fld id="{E7153C23-280C-6C4E-BD6E-2850A1F48140}" type="datetime1">
               <a:rPr lang="nb-NO" smtClean="0"/>
               <a:pPr/>
-              <a:t>09.09.2012</a:t>
+              <a:t>10.09.2012</a:t>
             </a:fld>
             <a:endParaRPr lang="nn-NO"/>
           </a:p>
@@ -16573,7 +17101,7 @@
             <a:fld id="{E7153C23-280C-6C4E-BD6E-2850A1F48140}" type="datetime1">
               <a:rPr lang="nb-NO" smtClean="0"/>
               <a:pPr/>
-              <a:t>09.09.2012</a:t>
+              <a:t>10.09.2012</a:t>
             </a:fld>
             <a:endParaRPr lang="nn-NO"/>
           </a:p>
@@ -16761,7 +17289,7 @@
             <a:fld id="{E7153C23-280C-6C4E-BD6E-2850A1F48140}" type="datetime1">
               <a:rPr lang="nb-NO" smtClean="0"/>
               <a:pPr/>
-              <a:t>09.09.2012</a:t>
+              <a:t>10.09.2012</a:t>
             </a:fld>
             <a:endParaRPr lang="nn-NO"/>
           </a:p>
@@ -16897,7 +17425,7 @@
             <a:fld id="{E7153C23-280C-6C4E-BD6E-2850A1F48140}" type="datetime1">
               <a:rPr lang="nb-NO" smtClean="0"/>
               <a:pPr/>
-              <a:t>09.09.2012</a:t>
+              <a:t>10.09.2012</a:t>
             </a:fld>
             <a:endParaRPr lang="nn-NO"/>
           </a:p>
@@ -17063,7 +17591,7 @@
             <a:fld id="{E7153C23-280C-6C4E-BD6E-2850A1F48140}" type="datetime1">
               <a:rPr lang="nb-NO" smtClean="0"/>
               <a:pPr/>
-              <a:t>09.09.2012</a:t>
+              <a:t>10.09.2012</a:t>
             </a:fld>
             <a:endParaRPr lang="nn-NO"/>
           </a:p>
@@ -17199,7 +17727,7 @@
             <a:fld id="{E7153C23-280C-6C4E-BD6E-2850A1F48140}" type="datetime1">
               <a:rPr lang="nb-NO" smtClean="0"/>
               <a:pPr/>
-              <a:t>09.09.2012</a:t>
+              <a:t>10.09.2012</a:t>
             </a:fld>
             <a:endParaRPr lang="nn-NO"/>
           </a:p>
@@ -17335,7 +17863,7 @@
             <a:fld id="{E7153C23-280C-6C4E-BD6E-2850A1F48140}" type="datetime1">
               <a:rPr lang="nb-NO" smtClean="0"/>
               <a:pPr/>
-              <a:t>09.09.2012</a:t>
+              <a:t>10.09.2012</a:t>
             </a:fld>
             <a:endParaRPr lang="nn-NO"/>
           </a:p>
@@ -17471,7 +17999,7 @@
             <a:fld id="{E7153C23-280C-6C4E-BD6E-2850A1F48140}" type="datetime1">
               <a:rPr lang="nb-NO" smtClean="0"/>
               <a:pPr/>
-              <a:t>09.09.2012</a:t>
+              <a:t>10.09.2012</a:t>
             </a:fld>
             <a:endParaRPr lang="nn-NO"/>
           </a:p>
@@ -17607,7 +18135,7 @@
             <a:fld id="{E7153C23-280C-6C4E-BD6E-2850A1F48140}" type="datetime1">
               <a:rPr lang="nb-NO" smtClean="0"/>
               <a:pPr/>
-              <a:t>09.09.2012</a:t>
+              <a:t>10.09.2012</a:t>
             </a:fld>
             <a:endParaRPr lang="nn-NO"/>
           </a:p>
@@ -17743,7 +18271,7 @@
             <a:fld id="{E7153C23-280C-6C4E-BD6E-2850A1F48140}" type="datetime1">
               <a:rPr lang="nb-NO" smtClean="0"/>
               <a:pPr/>
-              <a:t>09.09.2012</a:t>
+              <a:t>10.09.2012</a:t>
             </a:fld>
             <a:endParaRPr lang="nn-NO"/>
           </a:p>
@@ -17879,7 +18407,7 @@
             <a:fld id="{E7153C23-280C-6C4E-BD6E-2850A1F48140}" type="datetime1">
               <a:rPr lang="nb-NO" smtClean="0"/>
               <a:pPr/>
-              <a:t>09.09.2012</a:t>
+              <a:t>10.09.2012</a:t>
             </a:fld>
             <a:endParaRPr lang="nn-NO"/>
           </a:p>
@@ -18015,7 +18543,7 @@
             <a:fld id="{E7153C23-280C-6C4E-BD6E-2850A1F48140}" type="datetime1">
               <a:rPr lang="nb-NO" smtClean="0"/>
               <a:pPr/>
-              <a:t>09.09.2012</a:t>
+              <a:t>10.09.2012</a:t>
             </a:fld>
             <a:endParaRPr lang="nn-NO"/>
           </a:p>
@@ -18151,7 +18679,7 @@
             <a:fld id="{E7153C23-280C-6C4E-BD6E-2850A1F48140}" type="datetime1">
               <a:rPr lang="nb-NO" smtClean="0"/>
               <a:pPr/>
-              <a:t>09.09.2012</a:t>
+              <a:t>10.09.2012</a:t>
             </a:fld>
             <a:endParaRPr lang="nn-NO"/>
           </a:p>
@@ -18287,7 +18815,7 @@
             <a:fld id="{E7153C23-280C-6C4E-BD6E-2850A1F48140}" type="datetime1">
               <a:rPr lang="nb-NO" smtClean="0"/>
               <a:pPr/>
-              <a:t>09.09.2012</a:t>
+              <a:t>10.09.2012</a:t>
             </a:fld>
             <a:endParaRPr lang="nn-NO"/>
           </a:p>
@@ -18423,7 +18951,7 @@
             <a:fld id="{E7153C23-280C-6C4E-BD6E-2850A1F48140}" type="datetime1">
               <a:rPr lang="nb-NO" smtClean="0"/>
               <a:pPr/>
-              <a:t>09.09.2012</a:t>
+              <a:t>10.09.2012</a:t>
             </a:fld>
             <a:endParaRPr lang="nn-NO"/>
           </a:p>
@@ -18559,7 +19087,7 @@
             <a:fld id="{E7153C23-280C-6C4E-BD6E-2850A1F48140}" type="datetime1">
               <a:rPr lang="nb-NO" smtClean="0"/>
               <a:pPr/>
-              <a:t>09.09.2012</a:t>
+              <a:t>10.09.2012</a:t>
             </a:fld>
             <a:endParaRPr lang="nn-NO"/>
           </a:p>
@@ -18695,7 +19223,7 @@
             <a:fld id="{E7153C23-280C-6C4E-BD6E-2850A1F48140}" type="datetime1">
               <a:rPr lang="nb-NO" smtClean="0"/>
               <a:pPr/>
-              <a:t>09.09.2012</a:t>
+              <a:t>10.09.2012</a:t>
             </a:fld>
             <a:endParaRPr lang="nn-NO"/>
           </a:p>
@@ -18831,7 +19359,7 @@
             <a:fld id="{E7153C23-280C-6C4E-BD6E-2850A1F48140}" type="datetime1">
               <a:rPr lang="nb-NO" smtClean="0"/>
               <a:pPr/>
-              <a:t>09.09.2012</a:t>
+              <a:t>10.09.2012</a:t>
             </a:fld>
             <a:endParaRPr lang="nn-NO"/>
           </a:p>
@@ -18967,7 +19495,7 @@
             <a:fld id="{E7153C23-280C-6C4E-BD6E-2850A1F48140}" type="datetime1">
               <a:rPr lang="nb-NO" smtClean="0"/>
               <a:pPr/>
-              <a:t>09.09.2012</a:t>
+              <a:t>10.09.2012</a:t>
             </a:fld>
             <a:endParaRPr lang="nn-NO"/>
           </a:p>
@@ -19103,7 +19631,7 @@
             <a:fld id="{E7153C23-280C-6C4E-BD6E-2850A1F48140}" type="datetime1">
               <a:rPr lang="nb-NO" smtClean="0"/>
               <a:pPr/>
-              <a:t>09.09.2012</a:t>
+              <a:t>10.09.2012</a:t>
             </a:fld>
             <a:endParaRPr lang="nn-NO"/>
           </a:p>
@@ -19267,7 +19795,7 @@
             <a:fld id="{E7153C23-280C-6C4E-BD6E-2850A1F48140}" type="datetime1">
               <a:rPr lang="nb-NO" smtClean="0"/>
               <a:pPr/>
-              <a:t>09.09.2012</a:t>
+              <a:t>10.09.2012</a:t>
             </a:fld>
             <a:endParaRPr lang="nn-NO"/>
           </a:p>
@@ -19403,7 +19931,7 @@
             <a:fld id="{E7153C23-280C-6C4E-BD6E-2850A1F48140}" type="datetime1">
               <a:rPr lang="nb-NO" smtClean="0"/>
               <a:pPr/>
-              <a:t>09.09.2012</a:t>
+              <a:t>10.09.2012</a:t>
             </a:fld>
             <a:endParaRPr lang="nn-NO"/>
           </a:p>
@@ -19539,7 +20067,7 @@
             <a:fld id="{E7153C23-280C-6C4E-BD6E-2850A1F48140}" type="datetime1">
               <a:rPr lang="nb-NO" smtClean="0"/>
               <a:pPr/>
-              <a:t>09.09.2012</a:t>
+              <a:t>10.09.2012</a:t>
             </a:fld>
             <a:endParaRPr lang="nn-NO"/>
           </a:p>
@@ -19679,7 +20207,7 @@
             <a:fld id="{E7153C23-280C-6C4E-BD6E-2850A1F48140}" type="datetime1">
               <a:rPr lang="nb-NO" smtClean="0"/>
               <a:pPr/>
-              <a:t>09.09.2012</a:t>
+              <a:t>10.09.2012</a:t>
             </a:fld>
             <a:endParaRPr lang="nn-NO"/>
           </a:p>
@@ -19815,7 +20343,7 @@
             <a:fld id="{E7153C23-280C-6C4E-BD6E-2850A1F48140}" type="datetime1">
               <a:rPr lang="nb-NO" smtClean="0"/>
               <a:pPr/>
-              <a:t>09.09.2012</a:t>
+              <a:t>10.09.2012</a:t>
             </a:fld>
             <a:endParaRPr lang="nn-NO"/>
           </a:p>
@@ -19951,7 +20479,7 @@
             <a:fld id="{E7153C23-280C-6C4E-BD6E-2850A1F48140}" type="datetime1">
               <a:rPr lang="nb-NO" smtClean="0"/>
               <a:pPr/>
-              <a:t>09.09.2012</a:t>
+              <a:t>10.09.2012</a:t>
             </a:fld>
             <a:endParaRPr lang="nn-NO"/>
           </a:p>
@@ -20087,7 +20615,7 @@
             <a:fld id="{E7153C23-280C-6C4E-BD6E-2850A1F48140}" type="datetime1">
               <a:rPr lang="nb-NO" smtClean="0"/>
               <a:pPr/>
-              <a:t>09.09.2012</a:t>
+              <a:t>10.09.2012</a:t>
             </a:fld>
             <a:endParaRPr lang="nn-NO"/>
           </a:p>
@@ -20223,7 +20751,7 @@
             <a:fld id="{E7153C23-280C-6C4E-BD6E-2850A1F48140}" type="datetime1">
               <a:rPr lang="nb-NO" smtClean="0"/>
               <a:pPr/>
-              <a:t>09.09.2012</a:t>
+              <a:t>10.09.2012</a:t>
             </a:fld>
             <a:endParaRPr lang="nn-NO"/>
           </a:p>
@@ -20330,7 +20858,7 @@
             <a:fld id="{E7153C23-280C-6C4E-BD6E-2850A1F48140}" type="datetime1">
               <a:rPr lang="nb-NO" smtClean="0"/>
               <a:pPr/>
-              <a:t>09.09.2012</a:t>
+              <a:t>10.09.2012</a:t>
             </a:fld>
             <a:endParaRPr lang="nn-NO"/>
           </a:p>
@@ -21635,6 +22163,15 @@
 </file>
 
 <file path=customXml/item1.xml><?xml version="1.0" encoding="utf-8"?>
+<?mso-contentType ?>
+<FormTemplates xmlns="http://schemas.microsoft.com/sharepoint/v3/contenttype/forms">
+  <Display>DocumentLibraryForm</Display>
+  <Edit>DocumentLibraryForm</Edit>
+  <New>DocumentLibraryForm</New>
+</FormTemplates>
+</file>
+
+<file path=customXml/item2.xml><?xml version="1.0" encoding="utf-8"?>
 <p:properties xmlns:p="http://schemas.microsoft.com/office/2006/metadata/properties" xmlns:xsi="http://www.w3.org/2001/XMLSchema-instance" xmlns:pc="http://schemas.microsoft.com/office/infopath/2007/PartnerControls">
   <documentManagement>
     <_dlc_DocId xmlns="d7702b9b-d8e5-4822-bc1c-ce88b7f04401">CJ6WEC5DWFJ7-32-54</_dlc_DocId>
@@ -21646,62 +22183,7 @@
 </p:properties>
 </file>
 
-<file path=customXml/item2.xml><?xml version="1.0" encoding="utf-8"?>
-<?mso-contentType ?>
-<FormTemplates xmlns="http://schemas.microsoft.com/sharepoint/v3/contenttype/forms">
-  <Display>DocumentLibraryForm</Display>
-  <Edit>DocumentLibraryForm</Edit>
-  <New>DocumentLibraryForm</New>
-</FormTemplates>
-</file>
-
 <file path=customXml/item3.xml><?xml version="1.0" encoding="utf-8"?>
-<?mso-contentType ?>
-<spe:Receivers xmlns:spe="http://schemas.microsoft.com/sharepoint/events">
-  <Receiver>
-    <Name>Document ID Generator</Name>
-    <Synchronization>Synchronous</Synchronization>
-    <Type>10001</Type>
-    <SequenceNumber>1000</SequenceNumber>
-    <Assembly>Microsoft.Office.DocumentManagement, Version=14.0.0.0, Culture=neutral, PublicKeyToken=71e9bce111e9429c</Assembly>
-    <Class>Microsoft.Office.DocumentManagement.Internal.DocIdHandler</Class>
-    <Data/>
-    <Filter/>
-  </Receiver>
-  <Receiver>
-    <Name>Document ID Generator</Name>
-    <Synchronization>Synchronous</Synchronization>
-    <Type>10002</Type>
-    <SequenceNumber>1001</SequenceNumber>
-    <Assembly>Microsoft.Office.DocumentManagement, Version=14.0.0.0, Culture=neutral, PublicKeyToken=71e9bce111e9429c</Assembly>
-    <Class>Microsoft.Office.DocumentManagement.Internal.DocIdHandler</Class>
-    <Data/>
-    <Filter/>
-  </Receiver>
-  <Receiver>
-    <Name>Document ID Generator</Name>
-    <Synchronization>Synchronous</Synchronization>
-    <Type>10004</Type>
-    <SequenceNumber>1002</SequenceNumber>
-    <Assembly>Microsoft.Office.DocumentManagement, Version=14.0.0.0, Culture=neutral, PublicKeyToken=71e9bce111e9429c</Assembly>
-    <Class>Microsoft.Office.DocumentManagement.Internal.DocIdHandler</Class>
-    <Data/>
-    <Filter/>
-  </Receiver>
-  <Receiver>
-    <Name>Document ID Generator</Name>
-    <Synchronization>Synchronous</Synchronization>
-    <Type>10006</Type>
-    <SequenceNumber>1003</SequenceNumber>
-    <Assembly>Microsoft.Office.DocumentManagement, Version=14.0.0.0, Culture=neutral, PublicKeyToken=71e9bce111e9429c</Assembly>
-    <Class>Microsoft.Office.DocumentManagement.Internal.DocIdHandler</Class>
-    <Data/>
-    <Filter/>
-  </Receiver>
-</spe:Receivers>
-</file>
-
-<file path=customXml/item4.xml><?xml version="1.0" encoding="utf-8"?>
 <ct:contentTypeSchema xmlns:ct="http://schemas.microsoft.com/office/2006/metadata/contentType" xmlns:ma="http://schemas.microsoft.com/office/2006/metadata/properties/metaAttributes" ct:_="" ma:_="" ma:contentTypeName="Dokument" ma:contentTypeID="0x010100EB67D3835F5DA049BA55889851FA8E19" ma:contentTypeVersion="0" ma:contentTypeDescription="Opprett et nytt dokument." ma:contentTypeScope="" ma:versionID="67d140b29519b0ab11c5049a0b5c17fe">
   <xsd:schema xmlns:xsd="http://www.w3.org/2001/XMLSchema" xmlns:xs="http://www.w3.org/2001/XMLSchema" xmlns:p="http://schemas.microsoft.com/office/2006/metadata/properties" xmlns:ns2="d7702b9b-d8e5-4822-bc1c-ce88b7f04401" targetNamespace="http://schemas.microsoft.com/office/2006/metadata/properties" ma:root="true" ma:fieldsID="01954eb5e7163845e96e307eb76d671a" ns2:_="">
     <xsd:import namespace="d7702b9b-d8e5-4822-bc1c-ce88b7f04401"/>
@@ -21846,7 +22328,61 @@
 </ct:contentTypeSchema>
 </file>
 
+<file path=customXml/item4.xml><?xml version="1.0" encoding="utf-8"?>
+<?mso-contentType ?>
+<spe:Receivers xmlns:spe="http://schemas.microsoft.com/sharepoint/events">
+  <Receiver>
+    <Name>Document ID Generator</Name>
+    <Synchronization>Synchronous</Synchronization>
+    <Type>10001</Type>
+    <SequenceNumber>1000</SequenceNumber>
+    <Assembly>Microsoft.Office.DocumentManagement, Version=14.0.0.0, Culture=neutral, PublicKeyToken=71e9bce111e9429c</Assembly>
+    <Class>Microsoft.Office.DocumentManagement.Internal.DocIdHandler</Class>
+    <Data/>
+    <Filter/>
+  </Receiver>
+  <Receiver>
+    <Name>Document ID Generator</Name>
+    <Synchronization>Synchronous</Synchronization>
+    <Type>10002</Type>
+    <SequenceNumber>1001</SequenceNumber>
+    <Assembly>Microsoft.Office.DocumentManagement, Version=14.0.0.0, Culture=neutral, PublicKeyToken=71e9bce111e9429c</Assembly>
+    <Class>Microsoft.Office.DocumentManagement.Internal.DocIdHandler</Class>
+    <Data/>
+    <Filter/>
+  </Receiver>
+  <Receiver>
+    <Name>Document ID Generator</Name>
+    <Synchronization>Synchronous</Synchronization>
+    <Type>10004</Type>
+    <SequenceNumber>1002</SequenceNumber>
+    <Assembly>Microsoft.Office.DocumentManagement, Version=14.0.0.0, Culture=neutral, PublicKeyToken=71e9bce111e9429c</Assembly>
+    <Class>Microsoft.Office.DocumentManagement.Internal.DocIdHandler</Class>
+    <Data/>
+    <Filter/>
+  </Receiver>
+  <Receiver>
+    <Name>Document ID Generator</Name>
+    <Synchronization>Synchronous</Synchronization>
+    <Type>10006</Type>
+    <SequenceNumber>1003</SequenceNumber>
+    <Assembly>Microsoft.Office.DocumentManagement, Version=14.0.0.0, Culture=neutral, PublicKeyToken=71e9bce111e9429c</Assembly>
+    <Class>Microsoft.Office.DocumentManagement.Internal.DocIdHandler</Class>
+    <Data/>
+    <Filter/>
+  </Receiver>
+</spe:Receivers>
+</file>
+
 <file path=customXml/itemProps1.xml><?xml version="1.0" encoding="utf-8"?>
+<ds:datastoreItem xmlns:ds="http://schemas.openxmlformats.org/officeDocument/2006/customXml" ds:itemID="{57DC16B6-EF95-42DE-B557-77DEA4E6DB3E}">
+  <ds:schemaRefs>
+    <ds:schemaRef ds:uri="http://schemas.microsoft.com/sharepoint/v3/contenttype/forms"/>
+  </ds:schemaRefs>
+</ds:datastoreItem>
+</file>
+
+<file path=customXml/itemProps2.xml><?xml version="1.0" encoding="utf-8"?>
 <ds:datastoreItem xmlns:ds="http://schemas.openxmlformats.org/officeDocument/2006/customXml" ds:itemID="{900315EF-D2FF-48EA-9267-D555C1460D34}">
   <ds:schemaRefs>
     <ds:schemaRef ds:uri="http://schemas.microsoft.com/office/2006/documentManagement/types"/>
@@ -21862,23 +22398,7 @@
 </ds:datastoreItem>
 </file>
 
-<file path=customXml/itemProps2.xml><?xml version="1.0" encoding="utf-8"?>
-<ds:datastoreItem xmlns:ds="http://schemas.openxmlformats.org/officeDocument/2006/customXml" ds:itemID="{57DC16B6-EF95-42DE-B557-77DEA4E6DB3E}">
-  <ds:schemaRefs>
-    <ds:schemaRef ds:uri="http://schemas.microsoft.com/sharepoint/v3/contenttype/forms"/>
-  </ds:schemaRefs>
-</ds:datastoreItem>
-</file>
-
 <file path=customXml/itemProps3.xml><?xml version="1.0" encoding="utf-8"?>
-<ds:datastoreItem xmlns:ds="http://schemas.openxmlformats.org/officeDocument/2006/customXml" ds:itemID="{AD641015-60DF-420A-AE7E-6EC7C6282C0D}">
-  <ds:schemaRefs>
-    <ds:schemaRef ds:uri="http://schemas.microsoft.com/sharepoint/events"/>
-  </ds:schemaRefs>
-</ds:datastoreItem>
-</file>
-
-<file path=customXml/itemProps4.xml><?xml version="1.0" encoding="utf-8"?>
 <ds:datastoreItem xmlns:ds="http://schemas.openxmlformats.org/officeDocument/2006/customXml" ds:itemID="{067B1829-E484-4F29-9317-BD4DD5D0D924}">
   <ds:schemaRefs>
     <ds:schemaRef ds:uri="http://schemas.microsoft.com/office/2006/metadata/contentType"/>
@@ -21894,4 +22414,12 @@
     <ds:schemaRef ds:uri="http://schemas.microsoft.com/internal/obd"/>
   </ds:schemaRefs>
 </ds:datastoreItem>
+</file>
+
+<file path=customXml/itemProps4.xml><?xml version="1.0" encoding="utf-8"?>
+<ds:datastoreItem xmlns:ds="http://schemas.openxmlformats.org/officeDocument/2006/customXml" ds:itemID="{AD641015-60DF-420A-AE7E-6EC7C6282C0D}">
+  <ds:schemaRefs>
+    <ds:schemaRef ds:uri="http://schemas.microsoft.com/sharepoint/events"/>
+  </ds:schemaRefs>
+</ds:datastoreItem>
 </file>
</xml_diff>